<commit_message>
WebConf official tutorial, code lignment
</commit_message>
<xml_diff>
--- a/Tutorial_WebConf.pptx
+++ b/Tutorial_WebConf.pptx
@@ -313,7 +313,7 @@
           <a:p>
             <a:fld id="{488C305F-8B13-4FFB-B314-CC42778F6F74}" type="datetimeFigureOut">
               <a:rPr lang="en-US" smtClean="0"/>
-              <a:t>4/5/2022</a:t>
+              <a:t>10/24/2022</a:t>
             </a:fld>
             <a:endParaRPr lang="en-US"/>
           </a:p>
@@ -513,7 +513,7 @@
           <a:p>
             <a:fld id="{488C305F-8B13-4FFB-B314-CC42778F6F74}" type="datetimeFigureOut">
               <a:rPr lang="en-US" smtClean="0"/>
-              <a:t>4/5/2022</a:t>
+              <a:t>10/24/2022</a:t>
             </a:fld>
             <a:endParaRPr lang="en-US"/>
           </a:p>
@@ -723,7 +723,7 @@
           <a:p>
             <a:fld id="{488C305F-8B13-4FFB-B314-CC42778F6F74}" type="datetimeFigureOut">
               <a:rPr lang="en-US" smtClean="0"/>
-              <a:t>4/5/2022</a:t>
+              <a:t>10/24/2022</a:t>
             </a:fld>
             <a:endParaRPr lang="en-US"/>
           </a:p>
@@ -923,7 +923,7 @@
           <a:p>
             <a:fld id="{488C305F-8B13-4FFB-B314-CC42778F6F74}" type="datetimeFigureOut">
               <a:rPr lang="en-US" smtClean="0"/>
-              <a:t>4/5/2022</a:t>
+              <a:t>10/24/2022</a:t>
             </a:fld>
             <a:endParaRPr lang="en-US"/>
           </a:p>
@@ -1199,7 +1199,7 @@
           <a:p>
             <a:fld id="{488C305F-8B13-4FFB-B314-CC42778F6F74}" type="datetimeFigureOut">
               <a:rPr lang="en-US" smtClean="0"/>
-              <a:t>4/5/2022</a:t>
+              <a:t>10/24/2022</a:t>
             </a:fld>
             <a:endParaRPr lang="en-US"/>
           </a:p>
@@ -1467,7 +1467,7 @@
           <a:p>
             <a:fld id="{488C305F-8B13-4FFB-B314-CC42778F6F74}" type="datetimeFigureOut">
               <a:rPr lang="en-US" smtClean="0"/>
-              <a:t>4/5/2022</a:t>
+              <a:t>10/24/2022</a:t>
             </a:fld>
             <a:endParaRPr lang="en-US"/>
           </a:p>
@@ -1882,7 +1882,7 @@
           <a:p>
             <a:fld id="{488C305F-8B13-4FFB-B314-CC42778F6F74}" type="datetimeFigureOut">
               <a:rPr lang="en-US" smtClean="0"/>
-              <a:t>4/5/2022</a:t>
+              <a:t>10/24/2022</a:t>
             </a:fld>
             <a:endParaRPr lang="en-US"/>
           </a:p>
@@ -2024,7 +2024,7 @@
           <a:p>
             <a:fld id="{488C305F-8B13-4FFB-B314-CC42778F6F74}" type="datetimeFigureOut">
               <a:rPr lang="en-US" smtClean="0"/>
-              <a:t>4/5/2022</a:t>
+              <a:t>10/24/2022</a:t>
             </a:fld>
             <a:endParaRPr lang="en-US"/>
           </a:p>
@@ -2137,7 +2137,7 @@
           <a:p>
             <a:fld id="{488C305F-8B13-4FFB-B314-CC42778F6F74}" type="datetimeFigureOut">
               <a:rPr lang="en-US" smtClean="0"/>
-              <a:t>4/5/2022</a:t>
+              <a:t>10/24/2022</a:t>
             </a:fld>
             <a:endParaRPr lang="en-US"/>
           </a:p>
@@ -2450,7 +2450,7 @@
           <a:p>
             <a:fld id="{488C305F-8B13-4FFB-B314-CC42778F6F74}" type="datetimeFigureOut">
               <a:rPr lang="en-US" smtClean="0"/>
-              <a:t>4/5/2022</a:t>
+              <a:t>10/24/2022</a:t>
             </a:fld>
             <a:endParaRPr lang="en-US"/>
           </a:p>
@@ -2739,7 +2739,7 @@
           <a:p>
             <a:fld id="{488C305F-8B13-4FFB-B314-CC42778F6F74}" type="datetimeFigureOut">
               <a:rPr lang="en-US" smtClean="0"/>
-              <a:t>4/5/2022</a:t>
+              <a:t>10/24/2022</a:t>
             </a:fld>
             <a:endParaRPr lang="en-US"/>
           </a:p>
@@ -2982,7 +2982,7 @@
           <a:p>
             <a:fld id="{488C305F-8B13-4FFB-B314-CC42778F6F74}" type="datetimeFigureOut">
               <a:rPr lang="en-US" smtClean="0"/>
-              <a:t>4/5/2022</a:t>
+              <a:t>10/24/2022</a:t>
             </a:fld>
             <a:endParaRPr lang="en-US"/>
           </a:p>

</xml_diff>